<commit_message>
Additional Sep 9 changes
</commit_message>
<xml_diff>
--- a/Teaching/Chemistry/FCC Chem 3A Chap  5 Content.pptx
+++ b/Teaching/Chemistry/FCC Chem 3A Chap  5 Content.pptx
@@ -5,7 +5,7 @@
     <p:sldMasterId id="2147483803" r:id="rId1"/>
   </p:sldMasterIdLst>
   <p:notesMasterIdLst>
-    <p:notesMasterId r:id="rId30"/>
+    <p:notesMasterId r:id="rId29"/>
   </p:notesMasterIdLst>
   <p:sldIdLst>
     <p:sldId id="608" r:id="rId2"/>
@@ -34,8 +34,7 @@
     <p:sldId id="854" r:id="rId25"/>
     <p:sldId id="855" r:id="rId26"/>
     <p:sldId id="856" r:id="rId27"/>
-    <p:sldId id="857" r:id="rId28"/>
-    <p:sldId id="838" r:id="rId29"/>
+    <p:sldId id="838" r:id="rId28"/>
   </p:sldIdLst>
   <p:sldSz cx="9144000" cy="6858000" type="screen4x3"/>
   <p:notesSz cx="7315200" cy="9601200"/>
@@ -11472,8 +11471,8 @@
           </a:p>
         </p:txBody>
       </p:sp>
-      <mc:AlternateContent xmlns:mc="http://schemas.openxmlformats.org/markup-compatibility/2006" xmlns:a14="http://schemas.microsoft.com/office/drawing/2010/main">
-        <mc:Choice Requires="a14">
+      <mc:AlternateContent xmlns:mc="http://schemas.openxmlformats.org/markup-compatibility/2006">
+        <mc:Choice xmlns:a14="http://schemas.microsoft.com/office/drawing/2010/main" Requires="a14">
           <p:sp>
             <p:nvSpPr>
               <p:cNvPr id="3" name="Content Placeholder 2">
@@ -12064,7 +12063,7 @@
             </p:txBody>
           </p:sp>
         </mc:Choice>
-        <mc:Fallback xmlns="">
+        <mc:Fallback>
           <p:sp>
             <p:nvSpPr>
               <p:cNvPr id="3" name="Content Placeholder 2">
@@ -21418,86 +21417,6 @@
   <p:cSld>
     <p:spTree>
       <p:nvGrpSpPr>
-        <p:cNvPr id="1" name=""/>
-        <p:cNvGrpSpPr/>
-        <p:nvPr/>
-      </p:nvGrpSpPr>
-      <p:grpSpPr>
-        <a:xfrm>
-          <a:off x="0" y="0"/>
-          <a:ext cx="0" cy="0"/>
-          <a:chOff x="0" y="0"/>
-          <a:chExt cx="0" cy="0"/>
-        </a:xfrm>
-      </p:grpSpPr>
-      <p:sp>
-        <p:nvSpPr>
-          <p:cNvPr id="2" name="Title 1">
-            <a:extLst>
-              <a:ext uri="{FF2B5EF4-FFF2-40B4-BE49-F238E27FC236}">
-                <a16:creationId xmlns:a16="http://schemas.microsoft.com/office/drawing/2014/main" id="{265B87B7-4D10-B7A3-9E66-6F55C03F8BD7}"/>
-              </a:ext>
-            </a:extLst>
-          </p:cNvPr>
-          <p:cNvSpPr>
-            <a:spLocks noGrp="1"/>
-          </p:cNvSpPr>
-          <p:nvPr>
-            <p:ph type="title"/>
-          </p:nvPr>
-        </p:nvSpPr>
-        <p:spPr/>
-        <p:txBody>
-          <a:bodyPr/>
-          <a:lstStyle/>
-          <a:p>
-            <a:endParaRPr lang="en-US" dirty="0"/>
-          </a:p>
-        </p:txBody>
-      </p:sp>
-      <p:sp>
-        <p:nvSpPr>
-          <p:cNvPr id="3" name="Content Placeholder 2">
-            <a:extLst>
-              <a:ext uri="{FF2B5EF4-FFF2-40B4-BE49-F238E27FC236}">
-                <a16:creationId xmlns:a16="http://schemas.microsoft.com/office/drawing/2014/main" id="{2AC0F86A-5840-6A63-33F2-71992ACB9531}"/>
-              </a:ext>
-            </a:extLst>
-          </p:cNvPr>
-          <p:cNvSpPr>
-            <a:spLocks noGrp="1"/>
-          </p:cNvSpPr>
-          <p:nvPr>
-            <p:ph idx="1"/>
-          </p:nvPr>
-        </p:nvSpPr>
-        <p:spPr/>
-        <p:txBody>
-          <a:bodyPr/>
-          <a:lstStyle/>
-          <a:p>
-            <a:endParaRPr lang="en-US"/>
-          </a:p>
-        </p:txBody>
-      </p:sp>
-    </p:spTree>
-    <p:extLst>
-      <p:ext uri="{BB962C8B-B14F-4D97-AF65-F5344CB8AC3E}">
-        <p14:creationId xmlns:p14="http://schemas.microsoft.com/office/powerpoint/2010/main" val="481034196"/>
-      </p:ext>
-    </p:extLst>
-  </p:cSld>
-  <p:clrMapOvr>
-    <a:masterClrMapping/>
-  </p:clrMapOvr>
-</p:sld>
-</file>
-
-<file path=ppt/slides/slide28.xml><?xml version="1.0" encoding="utf-8"?>
-<p:sld xmlns:a="http://schemas.openxmlformats.org/drawingml/2006/main" xmlns:r="http://schemas.openxmlformats.org/officeDocument/2006/relationships" xmlns:p="http://schemas.openxmlformats.org/presentationml/2006/main">
-  <p:cSld>
-    <p:spTree>
-      <p:nvGrpSpPr>
         <p:cNvPr id="1" name="">
           <a:extLst>
             <a:ext uri="{FF2B5EF4-FFF2-40B4-BE49-F238E27FC236}">
@@ -22950,12 +22869,13 @@
         </p:nvCxnSpPr>
         <p:spPr>
           <a:xfrm flipV="1">
-            <a:off x="2400300" y="3191608"/>
-            <a:ext cx="888023" cy="483577"/>
+            <a:off x="2115733" y="3760150"/>
+            <a:ext cx="1353860" cy="355045"/>
           </a:xfrm>
           <a:prstGeom prst="line">
             <a:avLst/>
           </a:prstGeom>
+          <a:ln w="28575"/>
         </p:spPr>
         <p:style>
           <a:lnRef idx="1">
@@ -22981,17 +22901,20 @@
               </a:ext>
             </a:extLst>
           </p:cNvPr>
-          <p:cNvCxnSpPr/>
+          <p:cNvCxnSpPr>
+            <a:cxnSpLocks/>
+          </p:cNvCxnSpPr>
           <p:nvPr/>
         </p:nvCxnSpPr>
         <p:spPr>
           <a:xfrm flipV="1">
-            <a:off x="5644662" y="3429000"/>
-            <a:ext cx="975946" cy="430823"/>
+            <a:off x="5571858" y="4050707"/>
+            <a:ext cx="1102407" cy="230736"/>
           </a:xfrm>
           <a:prstGeom prst="line">
             <a:avLst/>
           </a:prstGeom>
+          <a:ln w="31750"/>
         </p:spPr>
         <p:style>
           <a:lnRef idx="1">
@@ -24074,8 +23997,8 @@
           </a:p>
         </p:txBody>
       </p:sp>
-      <mc:AlternateContent xmlns:mc="http://schemas.openxmlformats.org/markup-compatibility/2006" xmlns:a14="http://schemas.microsoft.com/office/drawing/2010/main">
-        <mc:Choice Requires="a14">
+      <mc:AlternateContent xmlns:mc="http://schemas.openxmlformats.org/markup-compatibility/2006">
+        <mc:Choice xmlns:a14="http://schemas.microsoft.com/office/drawing/2010/main" Requires="a14">
           <p:sp>
             <p:nvSpPr>
               <p:cNvPr id="3" name="Content Placeholder 2">
@@ -24825,17 +24748,36 @@
                     </m:oMathParaPr>
                     <m:oMath xmlns:m="http://schemas.openxmlformats.org/officeDocument/2006/math">
                       <m:r>
-                        <a:rPr lang="en-US" sz="2000" b="0" i="1" smtClean="0">
+                        <a:rPr lang="en-US" sz="2800" b="0" i="1" smtClean="0">
                           <a:latin typeface="Cambria Math" panose="02040503050406030204" pitchFamily="18" charset="0"/>
                           <a:ea typeface="Cambria Math" panose="02040503050406030204" pitchFamily="18" charset="0"/>
                         </a:rPr>
-                        <m:t>=20.3</m:t>
+                        <m:t>=</m:t>
+                      </m:r>
+                      <m:r>
+                        <a:rPr lang="en-US" sz="2800" b="0" i="1" smtClean="0">
+                          <a:solidFill>
+                            <a:schemeClr val="accent1">
+                              <a:lumMod val="60000"/>
+                              <a:lumOff val="40000"/>
+                            </a:schemeClr>
+                          </a:solidFill>
+                          <a:latin typeface="Cambria Math" panose="02040503050406030204" pitchFamily="18" charset="0"/>
+                          <a:ea typeface="Cambria Math" panose="02040503050406030204" pitchFamily="18" charset="0"/>
+                        </a:rPr>
+                        <m:t>20.3</m:t>
                       </m:r>
                       <m:r>
                         <m:rPr>
                           <m:nor/>
                         </m:rPr>
-                        <a:rPr lang="en-US" sz="2000" b="0" i="0" smtClean="0">
+                        <a:rPr lang="en-US" sz="2800" b="0" i="0" smtClean="0">
+                          <a:solidFill>
+                            <a:schemeClr val="accent1">
+                              <a:lumMod val="60000"/>
+                              <a:lumOff val="40000"/>
+                            </a:schemeClr>
+                          </a:solidFill>
                           <a:latin typeface="Cambria Math" panose="02040503050406030204" pitchFamily="18" charset="0"/>
                           <a:ea typeface="Cambria Math" panose="02040503050406030204" pitchFamily="18" charset="0"/>
                         </a:rPr>
@@ -24845,7 +24787,13 @@
                         <m:rPr>
                           <m:nor/>
                         </m:rPr>
-                        <a:rPr lang="en-US" sz="2000">
+                        <a:rPr lang="en-US" sz="2800">
+                          <a:solidFill>
+                            <a:schemeClr val="accent1">
+                              <a:lumMod val="60000"/>
+                              <a:lumOff val="40000"/>
+                            </a:schemeClr>
+                          </a:solidFill>
                           <a:latin typeface="Cambria Math" panose="02040503050406030204" pitchFamily="18" charset="0"/>
                           <a:ea typeface="Cambria Math" panose="02040503050406030204" pitchFamily="18" charset="0"/>
                         </a:rPr>
@@ -24854,7 +24802,7 @@
                       <m:sSub>
                         <m:sSubPr>
                           <m:ctrlPr>
-                            <a:rPr lang="en-US" sz="2000" i="1">
+                            <a:rPr lang="en-US" sz="2800" i="1">
                               <a:latin typeface="Cambria Math" panose="02040503050406030204" pitchFamily="18" charset="0"/>
                               <a:ea typeface="Cambria Math" panose="02040503050406030204" pitchFamily="18" charset="0"/>
                             </a:rPr>
@@ -24865,7 +24813,7 @@
                             <m:rPr>
                               <m:nor/>
                             </m:rPr>
-                            <a:rPr lang="en-US" sz="2000">
+                            <a:rPr lang="en-US" sz="2800">
                               <a:latin typeface="Cambria Math" panose="02040503050406030204" pitchFamily="18" charset="0"/>
                               <a:ea typeface="Cambria Math" panose="02040503050406030204" pitchFamily="18" charset="0"/>
                             </a:rPr>
@@ -24875,7 +24823,7 @@
                             <m:rPr>
                               <m:nor/>
                             </m:rPr>
-                            <a:rPr lang="en-US" sz="2000">
+                            <a:rPr lang="en-US" sz="2800">
                               <a:latin typeface="Cambria Math" panose="02040503050406030204" pitchFamily="18" charset="0"/>
                               <a:ea typeface="Cambria Math" panose="02040503050406030204" pitchFamily="18" charset="0"/>
                             </a:rPr>
@@ -24887,7 +24835,7 @@
                             <m:rPr>
                               <m:nor/>
                             </m:rPr>
-                            <a:rPr lang="en-US" sz="2000">
+                            <a:rPr lang="en-US" sz="2800">
                               <a:latin typeface="Cambria Math" panose="02040503050406030204" pitchFamily="18" charset="0"/>
                               <a:ea typeface="Cambria Math" panose="02040503050406030204" pitchFamily="18" charset="0"/>
                             </a:rPr>
@@ -24898,7 +24846,7 @@
                       <m:sSub>
                         <m:sSubPr>
                           <m:ctrlPr>
-                            <a:rPr lang="en-US" sz="2000" i="1">
+                            <a:rPr lang="en-US" sz="2800" i="1">
                               <a:latin typeface="Cambria Math" panose="02040503050406030204" pitchFamily="18" charset="0"/>
                               <a:ea typeface="Cambria Math" panose="02040503050406030204" pitchFamily="18" charset="0"/>
                             </a:rPr>
@@ -24909,7 +24857,7 @@
                             <m:rPr>
                               <m:nor/>
                             </m:rPr>
-                            <a:rPr lang="en-US" sz="2000">
+                            <a:rPr lang="en-US" sz="2800">
                               <a:latin typeface="Cambria Math" panose="02040503050406030204" pitchFamily="18" charset="0"/>
                               <a:ea typeface="Cambria Math" panose="02040503050406030204" pitchFamily="18" charset="0"/>
                             </a:rPr>
@@ -24918,7 +24866,7 @@
                         </m:e>
                         <m:sub>
                           <m:r>
-                            <a:rPr lang="en-US" sz="2000" i="1">
+                            <a:rPr lang="en-US" sz="2800" i="1">
                               <a:latin typeface="Cambria Math" panose="02040503050406030204" pitchFamily="18" charset="0"/>
                               <a:ea typeface="Cambria Math" panose="02040503050406030204" pitchFamily="18" charset="0"/>
                             </a:rPr>
@@ -24955,7 +24903,7 @@
             </p:txBody>
           </p:sp>
         </mc:Choice>
-        <mc:Fallback xmlns="">
+        <mc:Fallback>
           <p:sp>
             <p:nvSpPr>
               <p:cNvPr id="3" name="Content Placeholder 2">

</xml_diff>

<commit_message>
11 Sep Class update
</commit_message>
<xml_diff>
--- a/Teaching/Chemistry/FCC Chem 3A Chap  5 Content.pptx
+++ b/Teaching/Chemistry/FCC Chem 3A Chap  5 Content.pptx
@@ -1,6 +1,6 @@
 
 <file path=ppt/presentation.xml><?xml version="1.0" encoding="utf-8"?>
-<p:presentation xmlns:a="http://schemas.openxmlformats.org/drawingml/2006/main" xmlns:r="http://schemas.openxmlformats.org/officeDocument/2006/relationships" xmlns:p="http://schemas.openxmlformats.org/presentationml/2006/main" saveSubsetFonts="1">
+<p:presentation xmlns:a="http://schemas.openxmlformats.org/drawingml/2006/main" xmlns:r="http://schemas.openxmlformats.org/officeDocument/2006/relationships" xmlns:p="http://schemas.openxmlformats.org/presentationml/2006/main" showSpecialPlsOnTitleSld="0" saveSubsetFonts="1">
   <p:sldMasterIdLst>
     <p:sldMasterId id="2147483803" r:id="rId1"/>
   </p:sldMasterIdLst>
@@ -821,6 +821,36 @@
           </a:p>
         </p:txBody>
       </p:sp>
+      <p:sp>
+        <p:nvSpPr>
+          <p:cNvPr id="7" name="Slide Number Placeholder 6">
+            <a:extLst>
+              <a:ext uri="{FF2B5EF4-FFF2-40B4-BE49-F238E27FC236}">
+                <a16:creationId xmlns:a16="http://schemas.microsoft.com/office/drawing/2014/main" id="{FBB2ACF8-7ACE-6945-205A-CE1969999FD0}"/>
+              </a:ext>
+            </a:extLst>
+          </p:cNvPr>
+          <p:cNvSpPr>
+            <a:spLocks noGrp="1"/>
+          </p:cNvSpPr>
+          <p:nvPr>
+            <p:ph type="sldNum" sz="quarter" idx="10"/>
+          </p:nvPr>
+        </p:nvSpPr>
+        <p:spPr/>
+        <p:txBody>
+          <a:bodyPr/>
+          <a:lstStyle/>
+          <a:p>
+            <a:fld id="{531A0563-52E7-4BC5-A59E-2C6137082CC9}" type="slidenum">
+              <a:rPr lang="en-US" smtClean="0"/>
+              <a:pPr/>
+              <a:t>‹#›</a:t>
+            </a:fld>
+            <a:endParaRPr lang="en-US" dirty="0"/>
+          </a:p>
+        </p:txBody>
+      </p:sp>
     </p:spTree>
     <p:extLst>
       <p:ext uri="{BB962C8B-B14F-4D97-AF65-F5344CB8AC3E}">
@@ -1958,6 +1988,36 @@
           </a:p>
         </p:txBody>
       </p:sp>
+      <p:sp>
+        <p:nvSpPr>
+          <p:cNvPr id="4" name="Slide Number Placeholder 3">
+            <a:extLst>
+              <a:ext uri="{FF2B5EF4-FFF2-40B4-BE49-F238E27FC236}">
+                <a16:creationId xmlns:a16="http://schemas.microsoft.com/office/drawing/2014/main" id="{8959F56B-A50C-28A6-55F6-1AD1D64D750E}"/>
+              </a:ext>
+            </a:extLst>
+          </p:cNvPr>
+          <p:cNvSpPr>
+            <a:spLocks noGrp="1"/>
+          </p:cNvSpPr>
+          <p:nvPr>
+            <p:ph type="sldNum" sz="quarter" idx="10"/>
+          </p:nvPr>
+        </p:nvSpPr>
+        <p:spPr/>
+        <p:txBody>
+          <a:bodyPr/>
+          <a:lstStyle/>
+          <a:p>
+            <a:fld id="{531A0563-52E7-4BC5-A59E-2C6137082CC9}" type="slidenum">
+              <a:rPr lang="en-US" smtClean="0"/>
+              <a:pPr/>
+              <a:t>‹#›</a:t>
+            </a:fld>
+            <a:endParaRPr lang="en-US" dirty="0"/>
+          </a:p>
+        </p:txBody>
+      </p:sp>
     </p:spTree>
     <p:extLst>
       <p:ext uri="{BB962C8B-B14F-4D97-AF65-F5344CB8AC3E}">
@@ -2108,6 +2168,36 @@
               <a:rPr lang="en-US"/>
               <a:t>Click to edit Master text styles</a:t>
             </a:r>
+          </a:p>
+        </p:txBody>
+      </p:sp>
+      <p:sp>
+        <p:nvSpPr>
+          <p:cNvPr id="4" name="Slide Number Placeholder 3">
+            <a:extLst>
+              <a:ext uri="{FF2B5EF4-FFF2-40B4-BE49-F238E27FC236}">
+                <a16:creationId xmlns:a16="http://schemas.microsoft.com/office/drawing/2014/main" id="{A10F692F-DC27-8F9F-1C60-2CAA6F0E57F5}"/>
+              </a:ext>
+            </a:extLst>
+          </p:cNvPr>
+          <p:cNvSpPr>
+            <a:spLocks noGrp="1"/>
+          </p:cNvSpPr>
+          <p:nvPr>
+            <p:ph type="sldNum" sz="quarter" idx="11"/>
+          </p:nvPr>
+        </p:nvSpPr>
+        <p:spPr/>
+        <p:txBody>
+          <a:bodyPr/>
+          <a:lstStyle/>
+          <a:p>
+            <a:fld id="{531A0563-52E7-4BC5-A59E-2C6137082CC9}" type="slidenum">
+              <a:rPr lang="en-US" smtClean="0"/>
+              <a:pPr/>
+              <a:t>‹#›</a:t>
+            </a:fld>
+            <a:endParaRPr lang="en-US" dirty="0"/>
           </a:p>
         </p:txBody>
       </p:sp>
@@ -3229,8 +3319,8 @@
         </p:nvSpPr>
         <p:spPr bwMode="auto">
           <a:xfrm>
-            <a:off x="372533" y="1332090"/>
-            <a:ext cx="8387645" cy="5215465"/>
+            <a:off x="372533" y="1332091"/>
+            <a:ext cx="8352367" cy="5162122"/>
           </a:xfrm>
           <a:prstGeom prst="rect">
             <a:avLst/>
@@ -3254,37 +3344,82 @@
           <a:p>
             <a:pPr lvl="0"/>
             <a:r>
-              <a:rPr lang="en-US"/>
+              <a:rPr lang="en-US" dirty="0"/>
               <a:t>Click to edit Master text styles</a:t>
             </a:r>
           </a:p>
           <a:p>
             <a:pPr lvl="1"/>
             <a:r>
-              <a:rPr lang="en-US"/>
+              <a:rPr lang="en-US" dirty="0"/>
               <a:t>Second level</a:t>
             </a:r>
           </a:p>
           <a:p>
             <a:pPr lvl="2"/>
             <a:r>
-              <a:rPr lang="en-US"/>
+              <a:rPr lang="en-US" dirty="0"/>
               <a:t>Third level</a:t>
             </a:r>
           </a:p>
           <a:p>
             <a:pPr lvl="3"/>
             <a:r>
-              <a:rPr lang="en-US"/>
+              <a:rPr lang="en-US" dirty="0"/>
               <a:t>Fourth level</a:t>
             </a:r>
           </a:p>
           <a:p>
             <a:pPr lvl="4"/>
             <a:r>
-              <a:rPr lang="en-US"/>
+              <a:rPr lang="en-US" dirty="0"/>
               <a:t>Fifth level</a:t>
             </a:r>
+          </a:p>
+        </p:txBody>
+      </p:sp>
+      <p:sp>
+        <p:nvSpPr>
+          <p:cNvPr id="2" name="Slide Number Placeholder 1">
+            <a:extLst>
+              <a:ext uri="{FF2B5EF4-FFF2-40B4-BE49-F238E27FC236}">
+                <a16:creationId xmlns:a16="http://schemas.microsoft.com/office/drawing/2014/main" id="{3D07881A-CE20-15DA-E8A0-F9E0C81F0D24}"/>
+              </a:ext>
+            </a:extLst>
+          </p:cNvPr>
+          <p:cNvSpPr>
+            <a:spLocks noGrp="1"/>
+          </p:cNvSpPr>
+          <p:nvPr>
+            <p:ph type="sldNum" sz="quarter" idx="4"/>
+          </p:nvPr>
+        </p:nvSpPr>
+        <p:spPr>
+          <a:xfrm>
+            <a:off x="7423150" y="6343650"/>
+            <a:ext cx="1605492" cy="469017"/>
+          </a:xfrm>
+          <a:prstGeom prst="rect">
+            <a:avLst/>
+          </a:prstGeom>
+        </p:spPr>
+        <p:txBody>
+          <a:bodyPr vert="horz" lIns="91440" tIns="45720" rIns="91440" bIns="45720" rtlCol="0" anchor="ctr"/>
+          <a:lstStyle>
+            <a:lvl1pPr algn="r">
+              <a:defRPr sz="1000" baseline="0">
+                <a:solidFill>
+                  <a:schemeClr val="bg1"/>
+                </a:solidFill>
+              </a:defRPr>
+            </a:lvl1pPr>
+          </a:lstStyle>
+          <a:p>
+            <a:fld id="{531A0563-52E7-4BC5-A59E-2C6137082CC9}" type="slidenum">
+              <a:rPr lang="en-US" smtClean="0"/>
+              <a:pPr/>
+              <a:t>‹#›</a:t>
+            </a:fld>
             <a:endParaRPr lang="en-US" dirty="0"/>
           </a:p>
         </p:txBody>
@@ -3315,7 +3450,7 @@
     <p:sldLayoutId id="2147483818" r:id="rId15"/>
     <p:sldLayoutId id="2147483802" r:id="rId16"/>
   </p:sldLayoutIdLst>
-  <p:hf sldNum="0" hdr="0" ftr="0" dt="0"/>
+  <p:hf hdr="0" ftr="0" dt="0"/>
   <p:txStyles>
     <p:titleStyle>
       <a:lvl1pPr algn="l" rtl="0" eaLnBrk="1" fontAlgn="base" hangingPunct="1">
@@ -11402,6 +11537,36 @@
           </a:prstGeom>
         </p:spPr>
       </p:pic>
+      <p:sp>
+        <p:nvSpPr>
+          <p:cNvPr id="4" name="Slide Number Placeholder 3">
+            <a:extLst>
+              <a:ext uri="{FF2B5EF4-FFF2-40B4-BE49-F238E27FC236}">
+                <a16:creationId xmlns:a16="http://schemas.microsoft.com/office/drawing/2014/main" id="{76ECFF3A-81E0-A50B-D1E7-D15A7BCE87FF}"/>
+              </a:ext>
+            </a:extLst>
+          </p:cNvPr>
+          <p:cNvSpPr>
+            <a:spLocks noGrp="1"/>
+          </p:cNvSpPr>
+          <p:nvPr>
+            <p:ph type="sldNum" sz="quarter" idx="10"/>
+          </p:nvPr>
+        </p:nvSpPr>
+        <p:spPr/>
+        <p:txBody>
+          <a:bodyPr/>
+          <a:lstStyle/>
+          <a:p>
+            <a:fld id="{531A0563-52E7-4BC5-A59E-2C6137082CC9}" type="slidenum">
+              <a:rPr lang="en-US" smtClean="0"/>
+              <a:pPr/>
+              <a:t>10</a:t>
+            </a:fld>
+            <a:endParaRPr lang="en-US" dirty="0"/>
+          </a:p>
+        </p:txBody>
+      </p:sp>
     </p:spTree>
     <p:extLst>
       <p:ext uri="{BB962C8B-B14F-4D97-AF65-F5344CB8AC3E}">
@@ -11471,8 +11636,8 @@
           </a:p>
         </p:txBody>
       </p:sp>
-      <mc:AlternateContent xmlns:mc="http://schemas.openxmlformats.org/markup-compatibility/2006">
-        <mc:Choice xmlns:a14="http://schemas.microsoft.com/office/drawing/2010/main" Requires="a14">
+      <mc:AlternateContent xmlns:mc="http://schemas.openxmlformats.org/markup-compatibility/2006" xmlns:a14="http://schemas.microsoft.com/office/drawing/2010/main">
+        <mc:Choice Requires="a14">
           <p:sp>
             <p:nvSpPr>
               <p:cNvPr id="3" name="Content Placeholder 2">
@@ -11678,17 +11843,7 @@
                         <a:latin typeface="Cambria Math" panose="02040503050406030204" pitchFamily="18" charset="0"/>
                         <a:ea typeface="Cambria Math" panose="02040503050406030204" pitchFamily="18" charset="0"/>
                       </a:rPr>
-                      <m:t>=18</m:t>
-                    </m:r>
-                    <m:r>
-                      <a:rPr lang="en-US" b="0" i="0" smtClean="0">
-                        <a:solidFill>
-                          <a:srgbClr val="00FF00"/>
-                        </a:solidFill>
-                        <a:latin typeface="Cambria Math" panose="02040503050406030204" pitchFamily="18" charset="0"/>
-                        <a:ea typeface="Cambria Math" panose="02040503050406030204" pitchFamily="18" charset="0"/>
-                      </a:rPr>
-                      <m:t>.016</m:t>
+                      <m:t>=18.016</m:t>
                     </m:r>
                     <m:f>
                       <m:fPr>
@@ -12063,7 +12218,7 @@
             </p:txBody>
           </p:sp>
         </mc:Choice>
-        <mc:Fallback>
+        <mc:Fallback xmlns="">
           <p:sp>
             <p:nvSpPr>
               <p:cNvPr id="3" name="Content Placeholder 2">
@@ -12137,6 +12292,36 @@
           </a:prstGeom>
         </p:spPr>
       </p:pic>
+      <p:sp>
+        <p:nvSpPr>
+          <p:cNvPr id="4" name="Slide Number Placeholder 3">
+            <a:extLst>
+              <a:ext uri="{FF2B5EF4-FFF2-40B4-BE49-F238E27FC236}">
+                <a16:creationId xmlns:a16="http://schemas.microsoft.com/office/drawing/2014/main" id="{AA7ECDCA-D492-BC19-C8C0-CA6E744D94FC}"/>
+              </a:ext>
+            </a:extLst>
+          </p:cNvPr>
+          <p:cNvSpPr>
+            <a:spLocks noGrp="1"/>
+          </p:cNvSpPr>
+          <p:nvPr>
+            <p:ph type="sldNum" sz="quarter" idx="10"/>
+          </p:nvPr>
+        </p:nvSpPr>
+        <p:spPr/>
+        <p:txBody>
+          <a:bodyPr/>
+          <a:lstStyle/>
+          <a:p>
+            <a:fld id="{531A0563-52E7-4BC5-A59E-2C6137082CC9}" type="slidenum">
+              <a:rPr lang="en-US" smtClean="0"/>
+              <a:pPr/>
+              <a:t>11</a:t>
+            </a:fld>
+            <a:endParaRPr lang="en-US" dirty="0"/>
+          </a:p>
+        </p:txBody>
+      </p:sp>
     </p:spTree>
     <p:extLst>
       <p:ext uri="{BB962C8B-B14F-4D97-AF65-F5344CB8AC3E}">
@@ -13008,7 +13193,7 @@
         </p:blipFill>
         <p:spPr>
           <a:xfrm>
-            <a:off x="4245428" y="3912659"/>
+            <a:off x="1898013" y="3850313"/>
             <a:ext cx="4658119" cy="2634896"/>
           </a:xfrm>
           <a:prstGeom prst="rect">
@@ -13016,6 +13201,36 @@
           </a:prstGeom>
         </p:spPr>
       </p:pic>
+      <p:sp>
+        <p:nvSpPr>
+          <p:cNvPr id="4" name="Slide Number Placeholder 3">
+            <a:extLst>
+              <a:ext uri="{FF2B5EF4-FFF2-40B4-BE49-F238E27FC236}">
+                <a16:creationId xmlns:a16="http://schemas.microsoft.com/office/drawing/2014/main" id="{023BEFFD-5C0B-0E0A-3996-A78EB9EBE1E7}"/>
+              </a:ext>
+            </a:extLst>
+          </p:cNvPr>
+          <p:cNvSpPr>
+            <a:spLocks noGrp="1"/>
+          </p:cNvSpPr>
+          <p:nvPr>
+            <p:ph type="sldNum" sz="quarter" idx="10"/>
+          </p:nvPr>
+        </p:nvSpPr>
+        <p:spPr/>
+        <p:txBody>
+          <a:bodyPr/>
+          <a:lstStyle/>
+          <a:p>
+            <a:fld id="{531A0563-52E7-4BC5-A59E-2C6137082CC9}" type="slidenum">
+              <a:rPr lang="en-US" smtClean="0"/>
+              <a:pPr/>
+              <a:t>12</a:t>
+            </a:fld>
+            <a:endParaRPr lang="en-US" dirty="0"/>
+          </a:p>
+        </p:txBody>
+      </p:sp>
     </p:spTree>
     <p:extLst>
       <p:ext uri="{BB962C8B-B14F-4D97-AF65-F5344CB8AC3E}">
@@ -13728,6 +13943,36 @@
           </a:prstGeom>
         </p:spPr>
       </p:pic>
+      <p:sp>
+        <p:nvSpPr>
+          <p:cNvPr id="4" name="Slide Number Placeholder 3">
+            <a:extLst>
+              <a:ext uri="{FF2B5EF4-FFF2-40B4-BE49-F238E27FC236}">
+                <a16:creationId xmlns:a16="http://schemas.microsoft.com/office/drawing/2014/main" id="{82137779-7B41-06AD-3700-F2DF5ADEB0A7}"/>
+              </a:ext>
+            </a:extLst>
+          </p:cNvPr>
+          <p:cNvSpPr>
+            <a:spLocks noGrp="1"/>
+          </p:cNvSpPr>
+          <p:nvPr>
+            <p:ph type="sldNum" sz="quarter" idx="10"/>
+          </p:nvPr>
+        </p:nvSpPr>
+        <p:spPr/>
+        <p:txBody>
+          <a:bodyPr/>
+          <a:lstStyle/>
+          <a:p>
+            <a:fld id="{531A0563-52E7-4BC5-A59E-2C6137082CC9}" type="slidenum">
+              <a:rPr lang="en-US" smtClean="0"/>
+              <a:pPr/>
+              <a:t>13</a:t>
+            </a:fld>
+            <a:endParaRPr lang="en-US" dirty="0"/>
+          </a:p>
+        </p:txBody>
+      </p:sp>
     </p:spTree>
     <p:extLst>
       <p:ext uri="{BB962C8B-B14F-4D97-AF65-F5344CB8AC3E}">
@@ -14587,6 +14832,36 @@
           </p:sp>
         </mc:Fallback>
       </mc:AlternateContent>
+      <p:sp>
+        <p:nvSpPr>
+          <p:cNvPr id="4" name="Slide Number Placeholder 3">
+            <a:extLst>
+              <a:ext uri="{FF2B5EF4-FFF2-40B4-BE49-F238E27FC236}">
+                <a16:creationId xmlns:a16="http://schemas.microsoft.com/office/drawing/2014/main" id="{39A33502-4121-1A6F-7DCB-941B0CC33B19}"/>
+              </a:ext>
+            </a:extLst>
+          </p:cNvPr>
+          <p:cNvSpPr>
+            <a:spLocks noGrp="1"/>
+          </p:cNvSpPr>
+          <p:nvPr>
+            <p:ph type="sldNum" sz="quarter" idx="10"/>
+          </p:nvPr>
+        </p:nvSpPr>
+        <p:spPr/>
+        <p:txBody>
+          <a:bodyPr/>
+          <a:lstStyle/>
+          <a:p>
+            <a:fld id="{531A0563-52E7-4BC5-A59E-2C6137082CC9}" type="slidenum">
+              <a:rPr lang="en-US" smtClean="0"/>
+              <a:pPr/>
+              <a:t>14</a:t>
+            </a:fld>
+            <a:endParaRPr lang="en-US" dirty="0"/>
+          </a:p>
+        </p:txBody>
+      </p:sp>
     </p:spTree>
     <p:extLst>
       <p:ext uri="{BB962C8B-B14F-4D97-AF65-F5344CB8AC3E}">
@@ -15971,6 +16246,36 @@
           </p:sp>
         </mc:Fallback>
       </mc:AlternateContent>
+      <p:sp>
+        <p:nvSpPr>
+          <p:cNvPr id="4" name="Slide Number Placeholder 3">
+            <a:extLst>
+              <a:ext uri="{FF2B5EF4-FFF2-40B4-BE49-F238E27FC236}">
+                <a16:creationId xmlns:a16="http://schemas.microsoft.com/office/drawing/2014/main" id="{2322D114-1317-EFFD-F8C5-36C65BE6F0E2}"/>
+              </a:ext>
+            </a:extLst>
+          </p:cNvPr>
+          <p:cNvSpPr>
+            <a:spLocks noGrp="1"/>
+          </p:cNvSpPr>
+          <p:nvPr>
+            <p:ph type="sldNum" sz="quarter" idx="10"/>
+          </p:nvPr>
+        </p:nvSpPr>
+        <p:spPr/>
+        <p:txBody>
+          <a:bodyPr/>
+          <a:lstStyle/>
+          <a:p>
+            <a:fld id="{531A0563-52E7-4BC5-A59E-2C6137082CC9}" type="slidenum">
+              <a:rPr lang="en-US" smtClean="0"/>
+              <a:pPr/>
+              <a:t>15</a:t>
+            </a:fld>
+            <a:endParaRPr lang="en-US" dirty="0"/>
+          </a:p>
+        </p:txBody>
+      </p:sp>
     </p:spTree>
     <p:extLst>
       <p:ext uri="{BB962C8B-B14F-4D97-AF65-F5344CB8AC3E}">
@@ -16756,6 +17061,36 @@
           </p:sp>
         </mc:Fallback>
       </mc:AlternateContent>
+      <p:sp>
+        <p:nvSpPr>
+          <p:cNvPr id="4" name="Slide Number Placeholder 3">
+            <a:extLst>
+              <a:ext uri="{FF2B5EF4-FFF2-40B4-BE49-F238E27FC236}">
+                <a16:creationId xmlns:a16="http://schemas.microsoft.com/office/drawing/2014/main" id="{6B42D960-9B00-A960-B85D-AF2E1A17D667}"/>
+              </a:ext>
+            </a:extLst>
+          </p:cNvPr>
+          <p:cNvSpPr>
+            <a:spLocks noGrp="1"/>
+          </p:cNvSpPr>
+          <p:nvPr>
+            <p:ph type="sldNum" sz="quarter" idx="10"/>
+          </p:nvPr>
+        </p:nvSpPr>
+        <p:spPr/>
+        <p:txBody>
+          <a:bodyPr/>
+          <a:lstStyle/>
+          <a:p>
+            <a:fld id="{531A0563-52E7-4BC5-A59E-2C6137082CC9}" type="slidenum">
+              <a:rPr lang="en-US" smtClean="0"/>
+              <a:pPr/>
+              <a:t>16</a:t>
+            </a:fld>
+            <a:endParaRPr lang="en-US" dirty="0"/>
+          </a:p>
+        </p:txBody>
+      </p:sp>
     </p:spTree>
     <p:extLst>
       <p:ext uri="{BB962C8B-B14F-4D97-AF65-F5344CB8AC3E}">
@@ -17009,6 +17344,36 @@
               </a:rPr>
               <a:t>elemental analysis</a:t>
             </a:r>
+          </a:p>
+        </p:txBody>
+      </p:sp>
+      <p:sp>
+        <p:nvSpPr>
+          <p:cNvPr id="4" name="Slide Number Placeholder 3">
+            <a:extLst>
+              <a:ext uri="{FF2B5EF4-FFF2-40B4-BE49-F238E27FC236}">
+                <a16:creationId xmlns:a16="http://schemas.microsoft.com/office/drawing/2014/main" id="{5EE03BF4-E3C7-905F-DA4C-5D6C93C564F4}"/>
+              </a:ext>
+            </a:extLst>
+          </p:cNvPr>
+          <p:cNvSpPr>
+            <a:spLocks noGrp="1"/>
+          </p:cNvSpPr>
+          <p:nvPr>
+            <p:ph type="sldNum" sz="quarter" idx="10"/>
+          </p:nvPr>
+        </p:nvSpPr>
+        <p:spPr/>
+        <p:txBody>
+          <a:bodyPr/>
+          <a:lstStyle/>
+          <a:p>
+            <a:fld id="{531A0563-52E7-4BC5-A59E-2C6137082CC9}" type="slidenum">
+              <a:rPr lang="en-US" smtClean="0"/>
+              <a:pPr/>
+              <a:t>17</a:t>
+            </a:fld>
+            <a:endParaRPr lang="en-US" dirty="0"/>
           </a:p>
         </p:txBody>
       </p:sp>
@@ -17268,6 +17633,36 @@
           </a:p>
           <a:p>
             <a:endParaRPr lang="en-US" sz="2200" dirty="0"/>
+          </a:p>
+        </p:txBody>
+      </p:sp>
+      <p:sp>
+        <p:nvSpPr>
+          <p:cNvPr id="4" name="Slide Number Placeholder 3">
+            <a:extLst>
+              <a:ext uri="{FF2B5EF4-FFF2-40B4-BE49-F238E27FC236}">
+                <a16:creationId xmlns:a16="http://schemas.microsoft.com/office/drawing/2014/main" id="{344E4462-5B68-1308-2C17-7FD1369B84C4}"/>
+              </a:ext>
+            </a:extLst>
+          </p:cNvPr>
+          <p:cNvSpPr>
+            <a:spLocks noGrp="1"/>
+          </p:cNvSpPr>
+          <p:nvPr>
+            <p:ph type="sldNum" sz="quarter" idx="10"/>
+          </p:nvPr>
+        </p:nvSpPr>
+        <p:spPr/>
+        <p:txBody>
+          <a:bodyPr/>
+          <a:lstStyle/>
+          <a:p>
+            <a:fld id="{531A0563-52E7-4BC5-A59E-2C6137082CC9}" type="slidenum">
+              <a:rPr lang="en-US" smtClean="0"/>
+              <a:pPr/>
+              <a:t>18</a:t>
+            </a:fld>
+            <a:endParaRPr lang="en-US" dirty="0"/>
           </a:p>
         </p:txBody>
       </p:sp>
@@ -18291,6 +18686,36 @@
           </p:sp>
         </mc:Fallback>
       </mc:AlternateContent>
+      <p:sp>
+        <p:nvSpPr>
+          <p:cNvPr id="4" name="Slide Number Placeholder 3">
+            <a:extLst>
+              <a:ext uri="{FF2B5EF4-FFF2-40B4-BE49-F238E27FC236}">
+                <a16:creationId xmlns:a16="http://schemas.microsoft.com/office/drawing/2014/main" id="{8DC42F3C-9C16-1268-411F-3EF834BCF15E}"/>
+              </a:ext>
+            </a:extLst>
+          </p:cNvPr>
+          <p:cNvSpPr>
+            <a:spLocks noGrp="1"/>
+          </p:cNvSpPr>
+          <p:nvPr>
+            <p:ph type="sldNum" sz="quarter" idx="10"/>
+          </p:nvPr>
+        </p:nvSpPr>
+        <p:spPr/>
+        <p:txBody>
+          <a:bodyPr/>
+          <a:lstStyle/>
+          <a:p>
+            <a:fld id="{531A0563-52E7-4BC5-A59E-2C6137082CC9}" type="slidenum">
+              <a:rPr lang="en-US" smtClean="0"/>
+              <a:pPr/>
+              <a:t>19</a:t>
+            </a:fld>
+            <a:endParaRPr lang="en-US" dirty="0"/>
+          </a:p>
+        </p:txBody>
+      </p:sp>
     </p:spTree>
     <p:extLst>
       <p:ext uri="{BB962C8B-B14F-4D97-AF65-F5344CB8AC3E}">
@@ -18445,6 +18870,36 @@
           </a:p>
         </p:txBody>
       </p:sp>
+      <p:sp>
+        <p:nvSpPr>
+          <p:cNvPr id="2" name="Slide Number Placeholder 1">
+            <a:extLst>
+              <a:ext uri="{FF2B5EF4-FFF2-40B4-BE49-F238E27FC236}">
+                <a16:creationId xmlns:a16="http://schemas.microsoft.com/office/drawing/2014/main" id="{120ADC6B-6C71-EFD2-6CB9-EFF247EDE436}"/>
+              </a:ext>
+            </a:extLst>
+          </p:cNvPr>
+          <p:cNvSpPr>
+            <a:spLocks noGrp="1"/>
+          </p:cNvSpPr>
+          <p:nvPr>
+            <p:ph type="sldNum" sz="quarter" idx="10"/>
+          </p:nvPr>
+        </p:nvSpPr>
+        <p:spPr/>
+        <p:txBody>
+          <a:bodyPr/>
+          <a:lstStyle/>
+          <a:p>
+            <a:fld id="{531A0563-52E7-4BC5-A59E-2C6137082CC9}" type="slidenum">
+              <a:rPr lang="en-US" smtClean="0"/>
+              <a:pPr/>
+              <a:t>2</a:t>
+            </a:fld>
+            <a:endParaRPr lang="en-US" dirty="0"/>
+          </a:p>
+        </p:txBody>
+      </p:sp>
     </p:spTree>
     <p:extLst>
       <p:ext uri="{BB962C8B-B14F-4D97-AF65-F5344CB8AC3E}">
@@ -18732,6 +19187,36 @@
           </a:prstGeom>
         </p:spPr>
       </p:pic>
+      <p:sp>
+        <p:nvSpPr>
+          <p:cNvPr id="4" name="Slide Number Placeholder 3">
+            <a:extLst>
+              <a:ext uri="{FF2B5EF4-FFF2-40B4-BE49-F238E27FC236}">
+                <a16:creationId xmlns:a16="http://schemas.microsoft.com/office/drawing/2014/main" id="{B9422C71-FE6B-48F0-D55B-2FFF37EF3E1D}"/>
+              </a:ext>
+            </a:extLst>
+          </p:cNvPr>
+          <p:cNvSpPr>
+            <a:spLocks noGrp="1"/>
+          </p:cNvSpPr>
+          <p:nvPr>
+            <p:ph type="sldNum" sz="quarter" idx="10"/>
+          </p:nvPr>
+        </p:nvSpPr>
+        <p:spPr/>
+        <p:txBody>
+          <a:bodyPr/>
+          <a:lstStyle/>
+          <a:p>
+            <a:fld id="{531A0563-52E7-4BC5-A59E-2C6137082CC9}" type="slidenum">
+              <a:rPr lang="en-US" smtClean="0"/>
+              <a:pPr/>
+              <a:t>20</a:t>
+            </a:fld>
+            <a:endParaRPr lang="en-US" dirty="0"/>
+          </a:p>
+        </p:txBody>
+      </p:sp>
     </p:spTree>
     <p:extLst>
       <p:ext uri="{BB962C8B-B14F-4D97-AF65-F5344CB8AC3E}">
@@ -18912,6 +19397,36 @@
           <a:effectLst/>
         </p:spPr>
       </p:pic>
+      <p:sp>
+        <p:nvSpPr>
+          <p:cNvPr id="3" name="Slide Number Placeholder 2">
+            <a:extLst>
+              <a:ext uri="{FF2B5EF4-FFF2-40B4-BE49-F238E27FC236}">
+                <a16:creationId xmlns:a16="http://schemas.microsoft.com/office/drawing/2014/main" id="{0C45EDD0-0D98-4442-A2E8-5A8842AB45D2}"/>
+              </a:ext>
+            </a:extLst>
+          </p:cNvPr>
+          <p:cNvSpPr>
+            <a:spLocks noGrp="1"/>
+          </p:cNvSpPr>
+          <p:nvPr>
+            <p:ph type="sldNum" sz="quarter" idx="10"/>
+          </p:nvPr>
+        </p:nvSpPr>
+        <p:spPr/>
+        <p:txBody>
+          <a:bodyPr/>
+          <a:lstStyle/>
+          <a:p>
+            <a:fld id="{531A0563-52E7-4BC5-A59E-2C6137082CC9}" type="slidenum">
+              <a:rPr lang="en-US" smtClean="0"/>
+              <a:pPr/>
+              <a:t>21</a:t>
+            </a:fld>
+            <a:endParaRPr lang="en-US" dirty="0"/>
+          </a:p>
+        </p:txBody>
+      </p:sp>
     </p:spTree>
     <p:extLst>
       <p:ext uri="{BB962C8B-B14F-4D97-AF65-F5344CB8AC3E}">
@@ -19968,6 +20483,36 @@
           </p:sp>
         </mc:Fallback>
       </mc:AlternateContent>
+      <p:sp>
+        <p:nvSpPr>
+          <p:cNvPr id="3" name="Slide Number Placeholder 2">
+            <a:extLst>
+              <a:ext uri="{FF2B5EF4-FFF2-40B4-BE49-F238E27FC236}">
+                <a16:creationId xmlns:a16="http://schemas.microsoft.com/office/drawing/2014/main" id="{065A959F-F92D-A50F-36C7-22688CCBFC1E}"/>
+              </a:ext>
+            </a:extLst>
+          </p:cNvPr>
+          <p:cNvSpPr>
+            <a:spLocks noGrp="1"/>
+          </p:cNvSpPr>
+          <p:nvPr>
+            <p:ph type="sldNum" sz="quarter" idx="10"/>
+          </p:nvPr>
+        </p:nvSpPr>
+        <p:spPr/>
+        <p:txBody>
+          <a:bodyPr/>
+          <a:lstStyle/>
+          <a:p>
+            <a:fld id="{531A0563-52E7-4BC5-A59E-2C6137082CC9}" type="slidenum">
+              <a:rPr lang="en-US" smtClean="0"/>
+              <a:pPr/>
+              <a:t>22</a:t>
+            </a:fld>
+            <a:endParaRPr lang="en-US" dirty="0"/>
+          </a:p>
+        </p:txBody>
+      </p:sp>
     </p:spTree>
     <p:extLst>
       <p:ext uri="{BB962C8B-B14F-4D97-AF65-F5344CB8AC3E}">
@@ -20210,6 +20755,36 @@
           </a:prstGeom>
         </p:spPr>
       </p:pic>
+      <p:sp>
+        <p:nvSpPr>
+          <p:cNvPr id="3" name="Slide Number Placeholder 2">
+            <a:extLst>
+              <a:ext uri="{FF2B5EF4-FFF2-40B4-BE49-F238E27FC236}">
+                <a16:creationId xmlns:a16="http://schemas.microsoft.com/office/drawing/2014/main" id="{6E703FD9-6DB0-F411-A7DA-0F190AAF1F06}"/>
+              </a:ext>
+            </a:extLst>
+          </p:cNvPr>
+          <p:cNvSpPr>
+            <a:spLocks noGrp="1"/>
+          </p:cNvSpPr>
+          <p:nvPr>
+            <p:ph type="sldNum" sz="quarter" idx="10"/>
+          </p:nvPr>
+        </p:nvSpPr>
+        <p:spPr/>
+        <p:txBody>
+          <a:bodyPr/>
+          <a:lstStyle/>
+          <a:p>
+            <a:fld id="{531A0563-52E7-4BC5-A59E-2C6137082CC9}" type="slidenum">
+              <a:rPr lang="en-US" smtClean="0"/>
+              <a:pPr/>
+              <a:t>23</a:t>
+            </a:fld>
+            <a:endParaRPr lang="en-US" dirty="0"/>
+          </a:p>
+        </p:txBody>
+      </p:sp>
     </p:spTree>
     <p:extLst>
       <p:ext uri="{BB962C8B-B14F-4D97-AF65-F5344CB8AC3E}">
@@ -20633,6 +21208,36 @@
           </a:prstGeom>
         </p:spPr>
       </p:pic>
+      <p:sp>
+        <p:nvSpPr>
+          <p:cNvPr id="3" name="Slide Number Placeholder 2">
+            <a:extLst>
+              <a:ext uri="{FF2B5EF4-FFF2-40B4-BE49-F238E27FC236}">
+                <a16:creationId xmlns:a16="http://schemas.microsoft.com/office/drawing/2014/main" id="{3A4D019B-2375-4946-26D1-4744B0C255D0}"/>
+              </a:ext>
+            </a:extLst>
+          </p:cNvPr>
+          <p:cNvSpPr>
+            <a:spLocks noGrp="1"/>
+          </p:cNvSpPr>
+          <p:nvPr>
+            <p:ph type="sldNum" sz="quarter" idx="10"/>
+          </p:nvPr>
+        </p:nvSpPr>
+        <p:spPr/>
+        <p:txBody>
+          <a:bodyPr/>
+          <a:lstStyle/>
+          <a:p>
+            <a:fld id="{531A0563-52E7-4BC5-A59E-2C6137082CC9}" type="slidenum">
+              <a:rPr lang="en-US" smtClean="0"/>
+              <a:pPr/>
+              <a:t>24</a:t>
+            </a:fld>
+            <a:endParaRPr lang="en-US" dirty="0"/>
+          </a:p>
+        </p:txBody>
+      </p:sp>
     </p:spTree>
     <p:extLst>
       <p:ext uri="{BB962C8B-B14F-4D97-AF65-F5344CB8AC3E}">
@@ -20969,6 +21574,36 @@
               <a:t> Molecular Formula</a:t>
             </a:r>
             <a:endParaRPr lang="en-US" sz="4000" dirty="0"/>
+          </a:p>
+        </p:txBody>
+      </p:sp>
+      <p:sp>
+        <p:nvSpPr>
+          <p:cNvPr id="3" name="Slide Number Placeholder 2">
+            <a:extLst>
+              <a:ext uri="{FF2B5EF4-FFF2-40B4-BE49-F238E27FC236}">
+                <a16:creationId xmlns:a16="http://schemas.microsoft.com/office/drawing/2014/main" id="{4AF20550-F720-9219-20A3-4129664E25AC}"/>
+              </a:ext>
+            </a:extLst>
+          </p:cNvPr>
+          <p:cNvSpPr>
+            <a:spLocks noGrp="1"/>
+          </p:cNvSpPr>
+          <p:nvPr>
+            <p:ph type="sldNum" sz="quarter" idx="10"/>
+          </p:nvPr>
+        </p:nvSpPr>
+        <p:spPr/>
+        <p:txBody>
+          <a:bodyPr/>
+          <a:lstStyle/>
+          <a:p>
+            <a:fld id="{531A0563-52E7-4BC5-A59E-2C6137082CC9}" type="slidenum">
+              <a:rPr lang="en-US" smtClean="0"/>
+              <a:pPr/>
+              <a:t>25</a:t>
+            </a:fld>
+            <a:endParaRPr lang="en-US" dirty="0"/>
           </a:p>
         </p:txBody>
       </p:sp>
@@ -21399,6 +22034,36 @@
           </a:prstGeom>
         </p:spPr>
       </p:pic>
+      <p:sp>
+        <p:nvSpPr>
+          <p:cNvPr id="3" name="Slide Number Placeholder 2">
+            <a:extLst>
+              <a:ext uri="{FF2B5EF4-FFF2-40B4-BE49-F238E27FC236}">
+                <a16:creationId xmlns:a16="http://schemas.microsoft.com/office/drawing/2014/main" id="{7065FEC5-1248-86B2-6A0A-CE99DA3E6803}"/>
+              </a:ext>
+            </a:extLst>
+          </p:cNvPr>
+          <p:cNvSpPr>
+            <a:spLocks noGrp="1"/>
+          </p:cNvSpPr>
+          <p:nvPr>
+            <p:ph type="sldNum" sz="quarter" idx="10"/>
+          </p:nvPr>
+        </p:nvSpPr>
+        <p:spPr/>
+        <p:txBody>
+          <a:bodyPr/>
+          <a:lstStyle/>
+          <a:p>
+            <a:fld id="{531A0563-52E7-4BC5-A59E-2C6137082CC9}" type="slidenum">
+              <a:rPr lang="en-US" smtClean="0"/>
+              <a:pPr/>
+              <a:t>26</a:t>
+            </a:fld>
+            <a:endParaRPr lang="en-US" dirty="0"/>
+          </a:p>
+        </p:txBody>
+      </p:sp>
     </p:spTree>
     <p:extLst>
       <p:ext uri="{BB962C8B-B14F-4D97-AF65-F5344CB8AC3E}">
@@ -21560,6 +22225,36 @@
           </a:prstGeom>
         </p:spPr>
       </p:pic>
+      <p:sp>
+        <p:nvSpPr>
+          <p:cNvPr id="4" name="Slide Number Placeholder 3">
+            <a:extLst>
+              <a:ext uri="{FF2B5EF4-FFF2-40B4-BE49-F238E27FC236}">
+                <a16:creationId xmlns:a16="http://schemas.microsoft.com/office/drawing/2014/main" id="{13D5731D-2F8E-5313-041E-D3F6C6E264D8}"/>
+              </a:ext>
+            </a:extLst>
+          </p:cNvPr>
+          <p:cNvSpPr>
+            <a:spLocks noGrp="1"/>
+          </p:cNvSpPr>
+          <p:nvPr>
+            <p:ph type="sldNum" sz="quarter" idx="10"/>
+          </p:nvPr>
+        </p:nvSpPr>
+        <p:spPr/>
+        <p:txBody>
+          <a:bodyPr/>
+          <a:lstStyle/>
+          <a:p>
+            <a:fld id="{531A0563-52E7-4BC5-A59E-2C6137082CC9}" type="slidenum">
+              <a:rPr lang="en-US" smtClean="0"/>
+              <a:pPr/>
+              <a:t>27</a:t>
+            </a:fld>
+            <a:endParaRPr lang="en-US" dirty="0"/>
+          </a:p>
+        </p:txBody>
+      </p:sp>
     </p:spTree>
     <p:extLst>
       <p:ext uri="{BB962C8B-B14F-4D97-AF65-F5344CB8AC3E}">
@@ -21766,6 +22461,36 @@
                 <a:srgbClr val="FFC000"/>
               </a:solidFill>
             </a:endParaRPr>
+          </a:p>
+        </p:txBody>
+      </p:sp>
+      <p:sp>
+        <p:nvSpPr>
+          <p:cNvPr id="4" name="Slide Number Placeholder 3">
+            <a:extLst>
+              <a:ext uri="{FF2B5EF4-FFF2-40B4-BE49-F238E27FC236}">
+                <a16:creationId xmlns:a16="http://schemas.microsoft.com/office/drawing/2014/main" id="{5AF723C8-1934-4F89-8EAD-DDD81F733687}"/>
+              </a:ext>
+            </a:extLst>
+          </p:cNvPr>
+          <p:cNvSpPr>
+            <a:spLocks noGrp="1"/>
+          </p:cNvSpPr>
+          <p:nvPr>
+            <p:ph type="sldNum" sz="quarter" idx="10"/>
+          </p:nvPr>
+        </p:nvSpPr>
+        <p:spPr/>
+        <p:txBody>
+          <a:bodyPr/>
+          <a:lstStyle/>
+          <a:p>
+            <a:fld id="{531A0563-52E7-4BC5-A59E-2C6137082CC9}" type="slidenum">
+              <a:rPr lang="en-US" smtClean="0"/>
+              <a:pPr/>
+              <a:t>3</a:t>
+            </a:fld>
+            <a:endParaRPr lang="en-US" dirty="0"/>
           </a:p>
         </p:txBody>
       </p:sp>
@@ -22294,6 +23019,36 @@
           </a:prstGeom>
         </p:spPr>
       </p:pic>
+      <p:sp>
+        <p:nvSpPr>
+          <p:cNvPr id="5" name="Slide Number Placeholder 4">
+            <a:extLst>
+              <a:ext uri="{FF2B5EF4-FFF2-40B4-BE49-F238E27FC236}">
+                <a16:creationId xmlns:a16="http://schemas.microsoft.com/office/drawing/2014/main" id="{B35DA9B3-9B13-33A4-C1A0-9185F6350E8D}"/>
+              </a:ext>
+            </a:extLst>
+          </p:cNvPr>
+          <p:cNvSpPr>
+            <a:spLocks noGrp="1"/>
+          </p:cNvSpPr>
+          <p:nvPr>
+            <p:ph type="sldNum" sz="quarter" idx="10"/>
+          </p:nvPr>
+        </p:nvSpPr>
+        <p:spPr/>
+        <p:txBody>
+          <a:bodyPr/>
+          <a:lstStyle/>
+          <a:p>
+            <a:fld id="{531A0563-52E7-4BC5-A59E-2C6137082CC9}" type="slidenum">
+              <a:rPr lang="en-US" smtClean="0"/>
+              <a:pPr/>
+              <a:t>4</a:t>
+            </a:fld>
+            <a:endParaRPr lang="en-US" dirty="0"/>
+          </a:p>
+        </p:txBody>
+      </p:sp>
     </p:spTree>
     <p:extLst>
       <p:ext uri="{BB962C8B-B14F-4D97-AF65-F5344CB8AC3E}">
@@ -22961,6 +23716,36 @@
           </a:prstGeom>
         </p:spPr>
       </p:pic>
+      <p:sp>
+        <p:nvSpPr>
+          <p:cNvPr id="4" name="Slide Number Placeholder 3">
+            <a:extLst>
+              <a:ext uri="{FF2B5EF4-FFF2-40B4-BE49-F238E27FC236}">
+                <a16:creationId xmlns:a16="http://schemas.microsoft.com/office/drawing/2014/main" id="{E669C9AC-EFC2-F3DD-4E3E-51D988912634}"/>
+              </a:ext>
+            </a:extLst>
+          </p:cNvPr>
+          <p:cNvSpPr>
+            <a:spLocks noGrp="1"/>
+          </p:cNvSpPr>
+          <p:nvPr>
+            <p:ph type="sldNum" sz="quarter" idx="10"/>
+          </p:nvPr>
+        </p:nvSpPr>
+        <p:spPr/>
+        <p:txBody>
+          <a:bodyPr/>
+          <a:lstStyle/>
+          <a:p>
+            <a:fld id="{531A0563-52E7-4BC5-A59E-2C6137082CC9}" type="slidenum">
+              <a:rPr lang="en-US" smtClean="0"/>
+              <a:pPr/>
+              <a:t>5</a:t>
+            </a:fld>
+            <a:endParaRPr lang="en-US" dirty="0"/>
+          </a:p>
+        </p:txBody>
+      </p:sp>
     </p:spTree>
     <p:extLst>
       <p:ext uri="{BB962C8B-B14F-4D97-AF65-F5344CB8AC3E}">
@@ -23066,39 +23851,23 @@
                       <a:srgbClr val="92D050"/>
                     </a:solidFill>
                   </a:rPr>
-                  <a:t>molecules</a:t>
+                  <a:t>atoms of H (hydrogen) </a:t>
                 </a:r>
                 <a:r>
                   <a:rPr lang="en-US" dirty="0"/>
-                  <a:t> </a:t>
+                  <a:t>are</a:t>
                 </a:r>
                 <a:r>
                   <a:rPr lang="en-US" dirty="0">
                     <a:solidFill>
-                      <a:srgbClr val="FFC000"/>
+                      <a:srgbClr val="92D050"/>
                     </a:solidFill>
                   </a:rPr>
-                  <a:t>H</a:t>
-                </a:r>
-                <a:r>
-                  <a:rPr lang="en-US" baseline="-25000" dirty="0">
-                    <a:solidFill>
-                      <a:srgbClr val="FFC000"/>
-                    </a:solidFill>
-                  </a:rPr>
-                  <a:t>2</a:t>
-                </a:r>
-                <a:r>
-                  <a:rPr lang="en-US" dirty="0">
-                    <a:solidFill>
-                      <a:srgbClr val="FFC000"/>
-                    </a:solidFill>
-                  </a:rPr>
-                  <a:t>O</a:t>
+                  <a:t> </a:t>
                 </a:r>
                 <a:r>
                   <a:rPr lang="en-US" dirty="0"/>
-                  <a:t> in </a:t>
+                  <a:t>in </a:t>
                 </a:r>
                 <a:r>
                   <a:rPr lang="en-US" dirty="0">
@@ -23928,6 +24697,36 @@
           </a:fontRef>
         </p:style>
       </p:cxnSp>
+      <p:sp>
+        <p:nvSpPr>
+          <p:cNvPr id="4" name="Slide Number Placeholder 3">
+            <a:extLst>
+              <a:ext uri="{FF2B5EF4-FFF2-40B4-BE49-F238E27FC236}">
+                <a16:creationId xmlns:a16="http://schemas.microsoft.com/office/drawing/2014/main" id="{290E1B19-B38B-A626-B771-1358C15FAD2B}"/>
+              </a:ext>
+            </a:extLst>
+          </p:cNvPr>
+          <p:cNvSpPr>
+            <a:spLocks noGrp="1"/>
+          </p:cNvSpPr>
+          <p:nvPr>
+            <p:ph type="sldNum" sz="quarter" idx="10"/>
+          </p:nvPr>
+        </p:nvSpPr>
+        <p:spPr/>
+        <p:txBody>
+          <a:bodyPr/>
+          <a:lstStyle/>
+          <a:p>
+            <a:fld id="{531A0563-52E7-4BC5-A59E-2C6137082CC9}" type="slidenum">
+              <a:rPr lang="en-US" smtClean="0"/>
+              <a:pPr/>
+              <a:t>6</a:t>
+            </a:fld>
+            <a:endParaRPr lang="en-US" dirty="0"/>
+          </a:p>
+        </p:txBody>
+      </p:sp>
     </p:spTree>
     <p:extLst>
       <p:ext uri="{BB962C8B-B14F-4D97-AF65-F5344CB8AC3E}">
@@ -23997,8 +24796,8 @@
           </a:p>
         </p:txBody>
       </p:sp>
-      <mc:AlternateContent xmlns:mc="http://schemas.openxmlformats.org/markup-compatibility/2006">
-        <mc:Choice xmlns:a14="http://schemas.microsoft.com/office/drawing/2010/main" Requires="a14">
+      <mc:AlternateContent xmlns:mc="http://schemas.openxmlformats.org/markup-compatibility/2006" xmlns:a14="http://schemas.microsoft.com/office/drawing/2010/main">
+        <mc:Choice Requires="a14">
           <p:sp>
             <p:nvSpPr>
               <p:cNvPr id="3" name="Content Placeholder 2">
@@ -24903,7 +25702,7 @@
             </p:txBody>
           </p:sp>
         </mc:Choice>
-        <mc:Fallback>
+        <mc:Fallback xmlns="">
           <p:sp>
             <p:nvSpPr>
               <p:cNvPr id="3" name="Content Placeholder 2">
@@ -25115,6 +25914,36 @@
           </a:fontRef>
         </p:style>
       </p:cxnSp>
+      <p:sp>
+        <p:nvSpPr>
+          <p:cNvPr id="4" name="Slide Number Placeholder 3">
+            <a:extLst>
+              <a:ext uri="{FF2B5EF4-FFF2-40B4-BE49-F238E27FC236}">
+                <a16:creationId xmlns:a16="http://schemas.microsoft.com/office/drawing/2014/main" id="{93FD3D2E-BA69-4ECE-DB56-7C04FB0A0B25}"/>
+              </a:ext>
+            </a:extLst>
+          </p:cNvPr>
+          <p:cNvSpPr>
+            <a:spLocks noGrp="1"/>
+          </p:cNvSpPr>
+          <p:nvPr>
+            <p:ph type="sldNum" sz="quarter" idx="10"/>
+          </p:nvPr>
+        </p:nvSpPr>
+        <p:spPr/>
+        <p:txBody>
+          <a:bodyPr/>
+          <a:lstStyle/>
+          <a:p>
+            <a:fld id="{531A0563-52E7-4BC5-A59E-2C6137082CC9}" type="slidenum">
+              <a:rPr lang="en-US" smtClean="0"/>
+              <a:pPr/>
+              <a:t>7</a:t>
+            </a:fld>
+            <a:endParaRPr lang="en-US" dirty="0"/>
+          </a:p>
+        </p:txBody>
+      </p:sp>
     </p:spTree>
     <p:extLst>
       <p:ext uri="{BB962C8B-B14F-4D97-AF65-F5344CB8AC3E}">
@@ -25234,7 +26063,7 @@
             </a:r>
             <a:r>
               <a:rPr lang="en-US" dirty="0"/>
-              <a:t> of </a:t>
+              <a:t> (in grams) of </a:t>
             </a:r>
             <a:r>
               <a:rPr lang="en-US" dirty="0">
@@ -25272,6 +26101,83 @@
                 </a:solidFill>
               </a:rPr>
               <a:t>grams per mole</a:t>
+            </a:r>
+          </a:p>
+          <a:p>
+            <a:pPr marL="236538" lvl="1" indent="0">
+              <a:buNone/>
+            </a:pPr>
+            <a:r>
+              <a:rPr lang="en-US" dirty="0"/>
+              <a:t>Whenever the term </a:t>
+            </a:r>
+            <a:r>
+              <a:rPr lang="en-US" dirty="0">
+                <a:solidFill>
+                  <a:srgbClr val="00FF00"/>
+                </a:solidFill>
+              </a:rPr>
+              <a:t>mass</a:t>
+            </a:r>
+            <a:r>
+              <a:rPr lang="en-US" dirty="0"/>
+              <a:t> is used, it will refer to a quantity whose units will be in </a:t>
+            </a:r>
+            <a:r>
+              <a:rPr lang="en-US" dirty="0">
+                <a:solidFill>
+                  <a:srgbClr val="FFFF00"/>
+                </a:solidFill>
+              </a:rPr>
+              <a:t>grams</a:t>
+            </a:r>
+            <a:r>
+              <a:rPr lang="en-US" dirty="0"/>
+              <a:t> (or a power of 10 in grams: </a:t>
+            </a:r>
+            <a:r>
+              <a:rPr lang="en-US" dirty="0">
+                <a:solidFill>
+                  <a:srgbClr val="FFFF00"/>
+                </a:solidFill>
+              </a:rPr>
+              <a:t>kilograms</a:t>
+            </a:r>
+            <a:r>
+              <a:rPr lang="en-US" dirty="0"/>
+              <a:t> [kg], </a:t>
+            </a:r>
+            <a:r>
+              <a:rPr lang="en-US" dirty="0">
+                <a:solidFill>
+                  <a:srgbClr val="FFFF00"/>
+                </a:solidFill>
+              </a:rPr>
+              <a:t>milligrams</a:t>
+            </a:r>
+            <a:r>
+              <a:rPr lang="en-US" dirty="0"/>
+              <a:t> [mg], </a:t>
+            </a:r>
+            <a:r>
+              <a:rPr lang="en-US" dirty="0">
+                <a:solidFill>
+                  <a:srgbClr val="FFFF00"/>
+                </a:solidFill>
+              </a:rPr>
+              <a:t>micrograms</a:t>
+            </a:r>
+            <a:r>
+              <a:rPr lang="en-US" dirty="0"/>
+              <a:t> [µg], </a:t>
+            </a:r>
+            <a:r>
+              <a:rPr lang="en-US" dirty="0" err="1"/>
+              <a:t>etc</a:t>
+            </a:r>
+            <a:r>
+              <a:rPr lang="en-US" dirty="0"/>
+              <a:t>). A molar mass will be grams per mole.</a:t>
             </a:r>
           </a:p>
           <a:p>
@@ -25409,6 +26315,36 @@
                 <a:srgbClr val="92D050"/>
               </a:solidFill>
             </a:endParaRPr>
+          </a:p>
+        </p:txBody>
+      </p:sp>
+      <p:sp>
+        <p:nvSpPr>
+          <p:cNvPr id="4" name="Slide Number Placeholder 3">
+            <a:extLst>
+              <a:ext uri="{FF2B5EF4-FFF2-40B4-BE49-F238E27FC236}">
+                <a16:creationId xmlns:a16="http://schemas.microsoft.com/office/drawing/2014/main" id="{C1254090-D602-3AD5-E6CC-9159B5AC75FB}"/>
+              </a:ext>
+            </a:extLst>
+          </p:cNvPr>
+          <p:cNvSpPr>
+            <a:spLocks noGrp="1"/>
+          </p:cNvSpPr>
+          <p:nvPr>
+            <p:ph type="sldNum" sz="quarter" idx="10"/>
+          </p:nvPr>
+        </p:nvSpPr>
+        <p:spPr/>
+        <p:txBody>
+          <a:bodyPr/>
+          <a:lstStyle/>
+          <a:p>
+            <a:fld id="{531A0563-52E7-4BC5-A59E-2C6137082CC9}" type="slidenum">
+              <a:rPr lang="en-US" smtClean="0"/>
+              <a:pPr/>
+              <a:t>8</a:t>
+            </a:fld>
+            <a:endParaRPr lang="en-US" dirty="0"/>
           </a:p>
         </p:txBody>
       </p:sp>
@@ -25728,6 +26664,36 @@
           </a:prstGeom>
         </p:spPr>
       </p:pic>
+      <p:sp>
+        <p:nvSpPr>
+          <p:cNvPr id="4" name="Slide Number Placeholder 3">
+            <a:extLst>
+              <a:ext uri="{FF2B5EF4-FFF2-40B4-BE49-F238E27FC236}">
+                <a16:creationId xmlns:a16="http://schemas.microsoft.com/office/drawing/2014/main" id="{D1866567-5635-BBF4-859A-9F2F218F382C}"/>
+              </a:ext>
+            </a:extLst>
+          </p:cNvPr>
+          <p:cNvSpPr>
+            <a:spLocks noGrp="1"/>
+          </p:cNvSpPr>
+          <p:nvPr>
+            <p:ph type="sldNum" sz="quarter" idx="10"/>
+          </p:nvPr>
+        </p:nvSpPr>
+        <p:spPr/>
+        <p:txBody>
+          <a:bodyPr/>
+          <a:lstStyle/>
+          <a:p>
+            <a:fld id="{531A0563-52E7-4BC5-A59E-2C6137082CC9}" type="slidenum">
+              <a:rPr lang="en-US" smtClean="0"/>
+              <a:pPr/>
+              <a:t>9</a:t>
+            </a:fld>
+            <a:endParaRPr lang="en-US" dirty="0"/>
+          </a:p>
+        </p:txBody>
+      </p:sp>
     </p:spTree>
     <p:extLst>
       <p:ext uri="{BB962C8B-B14F-4D97-AF65-F5344CB8AC3E}">

</xml_diff>